<commit_message>
Jdk 1.8 gelen özellikler nelerdir DeLiSi = 1-)Default Method 2-)Lambda 3-)Stream API (Collection clean codes) 4-)Garbarage Collector 5-)Date API iyileştirme
</commit_message>
<xml_diff>
--- a/build/classes/com/ecodation/odevler/Birce Tanıl Alptekin - Ödev.pptx
+++ b/build/classes/com/ecodation/odevler/Birce Tanıl Alptekin - Ödev.pptx
@@ -5,7 +5,7 @@
     <p:sldMasterId id="2147483689" r:id="rId1"/>
   </p:sldMasterIdLst>
   <p:notesMasterIdLst>
-    <p:notesMasterId r:id="rId22"/>
+    <p:notesMasterId r:id="rId26"/>
   </p:notesMasterIdLst>
   <p:sldIdLst>
     <p:sldId id="256" r:id="rId2"/>
@@ -28,6 +28,10 @@
     <p:sldId id="274" r:id="rId19"/>
     <p:sldId id="275" r:id="rId20"/>
     <p:sldId id="270" r:id="rId21"/>
+    <p:sldId id="276" r:id="rId22"/>
+    <p:sldId id="277" r:id="rId23"/>
+    <p:sldId id="279" r:id="rId24"/>
+    <p:sldId id="278" r:id="rId25"/>
   </p:sldIdLst>
   <p:sldSz cx="12192000" cy="6858000"/>
   <p:notesSz cx="6858000" cy="9144000"/>
@@ -155,6 +159,14 @@
             <p14:sldId id="274"/>
             <p14:sldId id="275"/>
             <p14:sldId id="270"/>
+          </p14:sldIdLst>
+        </p14:section>
+        <p14:section name="ÖDEV 3 - 9 Mayıs" id="{FC6CDC9F-BF17-4F8C-91CA-3B676B95E4BC}">
+          <p14:sldIdLst>
+            <p14:sldId id="276"/>
+            <p14:sldId id="277"/>
+            <p14:sldId id="279"/>
+            <p14:sldId id="278"/>
           </p14:sldIdLst>
         </p14:section>
       </p14:sectionLst>
@@ -6858,7 +6870,7 @@
           <p:cNvPr id="2" name="Başlık 1">
             <a:extLst>
               <a:ext uri="{FF2B5EF4-FFF2-40B4-BE49-F238E27FC236}">
-                <a16:creationId xmlns:a16="http://schemas.microsoft.com/office/drawing/2014/main" xmlns="" id="{2A4414DC-8105-49F7-969B-DAF040FE15AB}"/>
+                <a16:creationId xmlns:a16="http://schemas.microsoft.com/office/drawing/2014/main" id="{2A4414DC-8105-49F7-969B-DAF040FE15AB}"/>
               </a:ext>
             </a:extLst>
           </p:cNvPr>
@@ -6887,7 +6899,7 @@
           <p:cNvPr id="3" name="Alt Başlık 2">
             <a:extLst>
               <a:ext uri="{FF2B5EF4-FFF2-40B4-BE49-F238E27FC236}">
-                <a16:creationId xmlns:a16="http://schemas.microsoft.com/office/drawing/2014/main" xmlns="" id="{AF45BC64-5714-4669-81B0-640DAB2494BA}"/>
+                <a16:creationId xmlns:a16="http://schemas.microsoft.com/office/drawing/2014/main" id="{AF45BC64-5714-4669-81B0-640DAB2494BA}"/>
               </a:ext>
             </a:extLst>
           </p:cNvPr>
@@ -6946,7 +6958,7 @@
           <p:cNvPr id="2" name="Başlık 1">
             <a:extLst>
               <a:ext uri="{FF2B5EF4-FFF2-40B4-BE49-F238E27FC236}">
-                <a16:creationId xmlns:a16="http://schemas.microsoft.com/office/drawing/2014/main" xmlns="" id="{CA7726E7-C57F-4925-A133-48999EF6B741}"/>
+                <a16:creationId xmlns:a16="http://schemas.microsoft.com/office/drawing/2014/main" id="{CA7726E7-C57F-4925-A133-48999EF6B741}"/>
               </a:ext>
             </a:extLst>
           </p:cNvPr>
@@ -6975,7 +6987,7 @@
           <p:cNvPr id="3" name="İçerik Yer Tutucusu 2">
             <a:extLst>
               <a:ext uri="{FF2B5EF4-FFF2-40B4-BE49-F238E27FC236}">
-                <a16:creationId xmlns:a16="http://schemas.microsoft.com/office/drawing/2014/main" xmlns="" id="{E428864D-B9BD-4AC3-BD0D-36A1ED5FB00E}"/>
+                <a16:creationId xmlns:a16="http://schemas.microsoft.com/office/drawing/2014/main" id="{E428864D-B9BD-4AC3-BD0D-36A1ED5FB00E}"/>
               </a:ext>
             </a:extLst>
           </p:cNvPr>
@@ -8026,7 +8038,7 @@
           <p:cNvPr id="2" name="Başlık 1">
             <a:extLst>
               <a:ext uri="{FF2B5EF4-FFF2-40B4-BE49-F238E27FC236}">
-                <a16:creationId xmlns:a16="http://schemas.microsoft.com/office/drawing/2014/main" xmlns="" id="{A8EC0199-7439-49CB-97E6-735C0A731D9E}"/>
+                <a16:creationId xmlns:a16="http://schemas.microsoft.com/office/drawing/2014/main" id="{A8EC0199-7439-49CB-97E6-735C0A731D9E}"/>
               </a:ext>
             </a:extLst>
           </p:cNvPr>
@@ -8055,7 +8067,7 @@
           <p:cNvPr id="3" name="İçerik Yer Tutucusu 2">
             <a:extLst>
               <a:ext uri="{FF2B5EF4-FFF2-40B4-BE49-F238E27FC236}">
-                <a16:creationId xmlns:a16="http://schemas.microsoft.com/office/drawing/2014/main" xmlns="" id="{7EF0BA6F-DE05-4DAF-8E61-96E3177275A3}"/>
+                <a16:creationId xmlns:a16="http://schemas.microsoft.com/office/drawing/2014/main" id="{7EF0BA6F-DE05-4DAF-8E61-96E3177275A3}"/>
               </a:ext>
             </a:extLst>
           </p:cNvPr>
@@ -9394,7 +9406,7 @@
           <p:cNvPr id="2" name="Başlık 1">
             <a:extLst>
               <a:ext uri="{FF2B5EF4-FFF2-40B4-BE49-F238E27FC236}">
-                <a16:creationId xmlns:a16="http://schemas.microsoft.com/office/drawing/2014/main" xmlns="" id="{0BFAA787-54CB-45C1-844D-54610BBE8E62}"/>
+                <a16:creationId xmlns:a16="http://schemas.microsoft.com/office/drawing/2014/main" id="{0BFAA787-54CB-45C1-844D-54610BBE8E62}"/>
               </a:ext>
             </a:extLst>
           </p:cNvPr>
@@ -9423,7 +9435,7 @@
           <p:cNvPr id="3" name="İçerik Yer Tutucusu 2">
             <a:extLst>
               <a:ext uri="{FF2B5EF4-FFF2-40B4-BE49-F238E27FC236}">
-                <a16:creationId xmlns:a16="http://schemas.microsoft.com/office/drawing/2014/main" xmlns="" id="{8E62D23E-FB08-41EF-909B-3C27BBADDEF6}"/>
+                <a16:creationId xmlns:a16="http://schemas.microsoft.com/office/drawing/2014/main" id="{8E62D23E-FB08-41EF-909B-3C27BBADDEF6}"/>
               </a:ext>
             </a:extLst>
           </p:cNvPr>
@@ -10999,7 +11011,7 @@
           <p:cNvPr id="4" name="Başlık 3">
             <a:extLst>
               <a:ext uri="{FF2B5EF4-FFF2-40B4-BE49-F238E27FC236}">
-                <a16:creationId xmlns:a16="http://schemas.microsoft.com/office/drawing/2014/main" xmlns="" id="{6BF35A91-7832-4A31-B49E-576FB2B1D69E}"/>
+                <a16:creationId xmlns:a16="http://schemas.microsoft.com/office/drawing/2014/main" id="{6BF35A91-7832-4A31-B49E-576FB2B1D69E}"/>
               </a:ext>
             </a:extLst>
           </p:cNvPr>
@@ -11028,7 +11040,7 @@
           <p:cNvPr id="5" name="Alt Başlık 4">
             <a:extLst>
               <a:ext uri="{FF2B5EF4-FFF2-40B4-BE49-F238E27FC236}">
-                <a16:creationId xmlns:a16="http://schemas.microsoft.com/office/drawing/2014/main" xmlns="" id="{26674E06-E41C-47FB-98F6-501C7B85BF00}"/>
+                <a16:creationId xmlns:a16="http://schemas.microsoft.com/office/drawing/2014/main" id="{26674E06-E41C-47FB-98F6-501C7B85BF00}"/>
               </a:ext>
             </a:extLst>
           </p:cNvPr>
@@ -11086,7 +11098,7 @@
           <p:cNvPr id="2" name="Başlık 1">
             <a:extLst>
               <a:ext uri="{FF2B5EF4-FFF2-40B4-BE49-F238E27FC236}">
-                <a16:creationId xmlns:a16="http://schemas.microsoft.com/office/drawing/2014/main" xmlns="" id="{96B6E6C4-F26A-4504-A767-D9A8CA53E13F}"/>
+                <a16:creationId xmlns:a16="http://schemas.microsoft.com/office/drawing/2014/main" id="{96B6E6C4-F26A-4504-A767-D9A8CA53E13F}"/>
               </a:ext>
             </a:extLst>
           </p:cNvPr>
@@ -11115,7 +11127,7 @@
           <p:cNvPr id="3" name="İçerik Yer Tutucusu 2">
             <a:extLst>
               <a:ext uri="{FF2B5EF4-FFF2-40B4-BE49-F238E27FC236}">
-                <a16:creationId xmlns:a16="http://schemas.microsoft.com/office/drawing/2014/main" xmlns="" id="{93F326E1-3340-427A-89C9-F207C712A8BA}"/>
+                <a16:creationId xmlns:a16="http://schemas.microsoft.com/office/drawing/2014/main" id="{93F326E1-3340-427A-89C9-F207C712A8BA}"/>
               </a:ext>
             </a:extLst>
           </p:cNvPr>
@@ -11274,23 +11286,15 @@
           <a:p>
             <a:r>
               <a:rPr lang="tr-TR" dirty="0"/>
-              <a:t>Switch </a:t>
-            </a:r>
-            <a:r>
-              <a:rPr lang="tr-TR"/>
-              <a:t>kullanımında </a:t>
+              <a:t>Switch kullanımında </a:t>
             </a:r>
             <a:r>
               <a:rPr lang="tr-TR" dirty="0" err="1"/>
-              <a:t>S</a:t>
-            </a:r>
-            <a:r>
-              <a:rPr lang="tr-TR" smtClean="0"/>
-              <a:t>tring </a:t>
+              <a:t>string</a:t>
             </a:r>
             <a:r>
               <a:rPr lang="tr-TR" dirty="0"/>
-              <a:t>türüne izin verilmesi</a:t>
+              <a:t> türüne izin verilmesi</a:t>
             </a:r>
           </a:p>
           <a:p>
@@ -11365,7 +11369,7 @@
           <p:cNvPr id="2" name="Başlık 1">
             <a:extLst>
               <a:ext uri="{FF2B5EF4-FFF2-40B4-BE49-F238E27FC236}">
-                <a16:creationId xmlns:a16="http://schemas.microsoft.com/office/drawing/2014/main" xmlns="" id="{1EBC05EB-BDA3-4153-91EE-9E899EE8BB85}"/>
+                <a16:creationId xmlns:a16="http://schemas.microsoft.com/office/drawing/2014/main" id="{1EBC05EB-BDA3-4153-91EE-9E899EE8BB85}"/>
               </a:ext>
             </a:extLst>
           </p:cNvPr>
@@ -11410,7 +11414,7 @@
           <p:cNvPr id="3" name="İçerik Yer Tutucusu 2">
             <a:extLst>
               <a:ext uri="{FF2B5EF4-FFF2-40B4-BE49-F238E27FC236}">
-                <a16:creationId xmlns:a16="http://schemas.microsoft.com/office/drawing/2014/main" xmlns="" id="{61351F56-3F6D-4C71-B9D4-0793289412A7}"/>
+                <a16:creationId xmlns:a16="http://schemas.microsoft.com/office/drawing/2014/main" id="{61351F56-3F6D-4C71-B9D4-0793289412A7}"/>
               </a:ext>
             </a:extLst>
           </p:cNvPr>
@@ -11509,7 +11513,7 @@
           <p:cNvPr id="2" name="Başlık 1">
             <a:extLst>
               <a:ext uri="{FF2B5EF4-FFF2-40B4-BE49-F238E27FC236}">
-                <a16:creationId xmlns:a16="http://schemas.microsoft.com/office/drawing/2014/main" xmlns="" id="{06A2D713-45C9-4D6A-A0BF-336812B62769}"/>
+                <a16:creationId xmlns:a16="http://schemas.microsoft.com/office/drawing/2014/main" id="{06A2D713-45C9-4D6A-A0BF-336812B62769}"/>
               </a:ext>
             </a:extLst>
           </p:cNvPr>
@@ -11558,7 +11562,7 @@
           <p:cNvPr id="3" name="İçerik Yer Tutucusu 2">
             <a:extLst>
               <a:ext uri="{FF2B5EF4-FFF2-40B4-BE49-F238E27FC236}">
-                <a16:creationId xmlns:a16="http://schemas.microsoft.com/office/drawing/2014/main" xmlns="" id="{F5E9E671-0FA6-4117-A81A-0996E3B0F639}"/>
+                <a16:creationId xmlns:a16="http://schemas.microsoft.com/office/drawing/2014/main" id="{F5E9E671-0FA6-4117-A81A-0996E3B0F639}"/>
               </a:ext>
             </a:extLst>
           </p:cNvPr>
@@ -11617,7 +11621,7 @@
           <p:cNvPr id="2" name="Başlık 1">
             <a:extLst>
               <a:ext uri="{FF2B5EF4-FFF2-40B4-BE49-F238E27FC236}">
-                <a16:creationId xmlns:a16="http://schemas.microsoft.com/office/drawing/2014/main" xmlns="" id="{34BB3A40-317A-4ACB-8FE0-66752F282706}"/>
+                <a16:creationId xmlns:a16="http://schemas.microsoft.com/office/drawing/2014/main" id="{34BB3A40-317A-4ACB-8FE0-66752F282706}"/>
               </a:ext>
             </a:extLst>
           </p:cNvPr>
@@ -11654,7 +11658,7 @@
           <p:cNvPr id="3" name="İçerik Yer Tutucusu 2">
             <a:extLst>
               <a:ext uri="{FF2B5EF4-FFF2-40B4-BE49-F238E27FC236}">
-                <a16:creationId xmlns:a16="http://schemas.microsoft.com/office/drawing/2014/main" xmlns="" id="{2CDC68B9-DA3E-4684-BD93-93B2EC70DE25}"/>
+                <a16:creationId xmlns:a16="http://schemas.microsoft.com/office/drawing/2014/main" id="{2CDC68B9-DA3E-4684-BD93-93B2EC70DE25}"/>
               </a:ext>
             </a:extLst>
           </p:cNvPr>
@@ -11745,7 +11749,7 @@
           <p:cNvPr id="2" name="Başlık 1">
             <a:extLst>
               <a:ext uri="{FF2B5EF4-FFF2-40B4-BE49-F238E27FC236}">
-                <a16:creationId xmlns:a16="http://schemas.microsoft.com/office/drawing/2014/main" xmlns="" id="{3D11DDE2-60F0-4485-81A3-5606C3007ADF}"/>
+                <a16:creationId xmlns:a16="http://schemas.microsoft.com/office/drawing/2014/main" id="{3D11DDE2-60F0-4485-81A3-5606C3007ADF}"/>
               </a:ext>
             </a:extLst>
           </p:cNvPr>
@@ -11778,7 +11782,7 @@
           <p:cNvPr id="3" name="İçerik Yer Tutucusu 2">
             <a:extLst>
               <a:ext uri="{FF2B5EF4-FFF2-40B4-BE49-F238E27FC236}">
-                <a16:creationId xmlns:a16="http://schemas.microsoft.com/office/drawing/2014/main" xmlns="" id="{41010692-913D-4F1D-9F9E-EEC05F9EE105}"/>
+                <a16:creationId xmlns:a16="http://schemas.microsoft.com/office/drawing/2014/main" id="{41010692-913D-4F1D-9F9E-EEC05F9EE105}"/>
               </a:ext>
             </a:extLst>
           </p:cNvPr>
@@ -11931,7 +11935,7 @@
           <p:cNvPr id="2" name="Başlık 1">
             <a:extLst>
               <a:ext uri="{FF2B5EF4-FFF2-40B4-BE49-F238E27FC236}">
-                <a16:creationId xmlns:a16="http://schemas.microsoft.com/office/drawing/2014/main" xmlns="" id="{A9AB1DE8-1F2B-400D-AE93-544E0E7E981E}"/>
+                <a16:creationId xmlns:a16="http://schemas.microsoft.com/office/drawing/2014/main" id="{A9AB1DE8-1F2B-400D-AE93-544E0E7E981E}"/>
               </a:ext>
             </a:extLst>
           </p:cNvPr>
@@ -11964,7 +11968,7 @@
           <p:cNvPr id="3" name="İçerik Yer Tutucusu 2">
             <a:extLst>
               <a:ext uri="{FF2B5EF4-FFF2-40B4-BE49-F238E27FC236}">
-                <a16:creationId xmlns:a16="http://schemas.microsoft.com/office/drawing/2014/main" xmlns="" id="{FCED5CBA-65DC-4A11-93BC-564A1180458E}"/>
+                <a16:creationId xmlns:a16="http://schemas.microsoft.com/office/drawing/2014/main" id="{FCED5CBA-65DC-4A11-93BC-564A1180458E}"/>
               </a:ext>
             </a:extLst>
           </p:cNvPr>
@@ -12210,7 +12214,7 @@
           <p:cNvPr id="2" name="Başlık 1">
             <a:extLst>
               <a:ext uri="{FF2B5EF4-FFF2-40B4-BE49-F238E27FC236}">
-                <a16:creationId xmlns:a16="http://schemas.microsoft.com/office/drawing/2014/main" xmlns="" id="{BC46967C-C17C-4C86-B194-316BDDAA99D4}"/>
+                <a16:creationId xmlns:a16="http://schemas.microsoft.com/office/drawing/2014/main" id="{BC46967C-C17C-4C86-B194-316BDDAA99D4}"/>
               </a:ext>
             </a:extLst>
           </p:cNvPr>
@@ -12239,7 +12243,7 @@
           <p:cNvPr id="3" name="İçerik Yer Tutucusu 2">
             <a:extLst>
               <a:ext uri="{FF2B5EF4-FFF2-40B4-BE49-F238E27FC236}">
-                <a16:creationId xmlns:a16="http://schemas.microsoft.com/office/drawing/2014/main" xmlns="" id="{7471933D-5F01-41AA-AAA3-1C34C96A44EB}"/>
+                <a16:creationId xmlns:a16="http://schemas.microsoft.com/office/drawing/2014/main" id="{7471933D-5F01-41AA-AAA3-1C34C96A44EB}"/>
               </a:ext>
             </a:extLst>
           </p:cNvPr>
@@ -12868,7 +12872,7 @@
           <p:cNvPr id="2" name="Başlık 1">
             <a:extLst>
               <a:ext uri="{FF2B5EF4-FFF2-40B4-BE49-F238E27FC236}">
-                <a16:creationId xmlns:a16="http://schemas.microsoft.com/office/drawing/2014/main" xmlns="" id="{70C6ACFD-2099-4068-898A-E1193C483CBB}"/>
+                <a16:creationId xmlns:a16="http://schemas.microsoft.com/office/drawing/2014/main" id="{70C6ACFD-2099-4068-898A-E1193C483CBB}"/>
               </a:ext>
             </a:extLst>
           </p:cNvPr>
@@ -12897,7 +12901,7 @@
           <p:cNvPr id="3" name="İçerik Yer Tutucusu 2">
             <a:extLst>
               <a:ext uri="{FF2B5EF4-FFF2-40B4-BE49-F238E27FC236}">
-                <a16:creationId xmlns:a16="http://schemas.microsoft.com/office/drawing/2014/main" xmlns="" id="{0062AD49-3BFF-4BBD-821D-2B0993082848}"/>
+                <a16:creationId xmlns:a16="http://schemas.microsoft.com/office/drawing/2014/main" id="{0062AD49-3BFF-4BBD-821D-2B0993082848}"/>
               </a:ext>
             </a:extLst>
           </p:cNvPr>
@@ -12987,6 +12991,926 @@
     <p:extLst>
       <p:ext uri="{BB962C8B-B14F-4D97-AF65-F5344CB8AC3E}">
         <p14:creationId xmlns:p14="http://schemas.microsoft.com/office/powerpoint/2010/main" val="2381153633"/>
+      </p:ext>
+    </p:extLst>
+  </p:cSld>
+  <p:clrMapOvr>
+    <a:masterClrMapping/>
+  </p:clrMapOvr>
+</p:sld>
+</file>
+
+<file path=ppt/slides/slide21.xml><?xml version="1.0" encoding="utf-8"?>
+<p:sld xmlns:a="http://schemas.openxmlformats.org/drawingml/2006/main" xmlns:r="http://schemas.openxmlformats.org/officeDocument/2006/relationships" xmlns:p="http://schemas.openxmlformats.org/presentationml/2006/main">
+  <p:cSld>
+    <p:spTree>
+      <p:nvGrpSpPr>
+        <p:cNvPr id="1" name=""/>
+        <p:cNvGrpSpPr/>
+        <p:nvPr/>
+      </p:nvGrpSpPr>
+      <p:grpSpPr>
+        <a:xfrm>
+          <a:off x="0" y="0"/>
+          <a:ext cx="0" cy="0"/>
+          <a:chOff x="0" y="0"/>
+          <a:chExt cx="0" cy="0"/>
+        </a:xfrm>
+      </p:grpSpPr>
+      <p:sp>
+        <p:nvSpPr>
+          <p:cNvPr id="4" name="Başlık 3">
+            <a:extLst>
+              <a:ext uri="{FF2B5EF4-FFF2-40B4-BE49-F238E27FC236}">
+                <a16:creationId xmlns:a16="http://schemas.microsoft.com/office/drawing/2014/main" id="{D27474D7-562C-4493-9A05-152378E54C15}"/>
+              </a:ext>
+            </a:extLst>
+          </p:cNvPr>
+          <p:cNvSpPr>
+            <a:spLocks noGrp="1"/>
+          </p:cNvSpPr>
+          <p:nvPr>
+            <p:ph type="ctrTitle"/>
+          </p:nvPr>
+        </p:nvSpPr>
+        <p:spPr/>
+        <p:txBody>
+          <a:bodyPr/>
+          <a:lstStyle/>
+          <a:p>
+            <a:r>
+              <a:rPr lang="tr-TR" dirty="0"/>
+              <a:t>Ödev 3</a:t>
+            </a:r>
+            <a:endParaRPr lang="en-GB" dirty="0"/>
+          </a:p>
+        </p:txBody>
+      </p:sp>
+      <p:sp>
+        <p:nvSpPr>
+          <p:cNvPr id="5" name="Alt Başlık 4">
+            <a:extLst>
+              <a:ext uri="{FF2B5EF4-FFF2-40B4-BE49-F238E27FC236}">
+                <a16:creationId xmlns:a16="http://schemas.microsoft.com/office/drawing/2014/main" id="{90209784-AD06-4619-B131-AD11BD32B054}"/>
+              </a:ext>
+            </a:extLst>
+          </p:cNvPr>
+          <p:cNvSpPr>
+            <a:spLocks noGrp="1"/>
+          </p:cNvSpPr>
+          <p:nvPr>
+            <p:ph type="subTitle" idx="1"/>
+          </p:nvPr>
+        </p:nvSpPr>
+        <p:spPr/>
+        <p:txBody>
+          <a:bodyPr/>
+          <a:lstStyle/>
+          <a:p>
+            <a:r>
+              <a:rPr lang="tr-TR" dirty="0"/>
+              <a:t>Birce Tanıl Alptekin</a:t>
+            </a:r>
+            <a:endParaRPr lang="en-GB" dirty="0"/>
+          </a:p>
+        </p:txBody>
+      </p:sp>
+    </p:spTree>
+    <p:extLst>
+      <p:ext uri="{BB962C8B-B14F-4D97-AF65-F5344CB8AC3E}">
+        <p14:creationId xmlns:p14="http://schemas.microsoft.com/office/powerpoint/2010/main" val="1395041649"/>
+      </p:ext>
+    </p:extLst>
+  </p:cSld>
+  <p:clrMapOvr>
+    <a:masterClrMapping/>
+  </p:clrMapOvr>
+</p:sld>
+</file>
+
+<file path=ppt/slides/slide22.xml><?xml version="1.0" encoding="utf-8"?>
+<p:sld xmlns:a="http://schemas.openxmlformats.org/drawingml/2006/main" xmlns:r="http://schemas.openxmlformats.org/officeDocument/2006/relationships" xmlns:p="http://schemas.openxmlformats.org/presentationml/2006/main">
+  <p:cSld>
+    <p:spTree>
+      <p:nvGrpSpPr>
+        <p:cNvPr id="1" name=""/>
+        <p:cNvGrpSpPr/>
+        <p:nvPr/>
+      </p:nvGrpSpPr>
+      <p:grpSpPr>
+        <a:xfrm>
+          <a:off x="0" y="0"/>
+          <a:ext cx="0" cy="0"/>
+          <a:chOff x="0" y="0"/>
+          <a:chExt cx="0" cy="0"/>
+        </a:xfrm>
+      </p:grpSpPr>
+      <p:sp>
+        <p:nvSpPr>
+          <p:cNvPr id="2" name="Başlık 1">
+            <a:extLst>
+              <a:ext uri="{FF2B5EF4-FFF2-40B4-BE49-F238E27FC236}">
+                <a16:creationId xmlns:a16="http://schemas.microsoft.com/office/drawing/2014/main" id="{7F7E5399-D379-40FF-98F9-F1D566880E59}"/>
+              </a:ext>
+            </a:extLst>
+          </p:cNvPr>
+          <p:cNvSpPr>
+            <a:spLocks noGrp="1"/>
+          </p:cNvSpPr>
+          <p:nvPr>
+            <p:ph type="title"/>
+          </p:nvPr>
+        </p:nvSpPr>
+        <p:spPr/>
+        <p:txBody>
+          <a:bodyPr/>
+          <a:lstStyle/>
+          <a:p>
+            <a:r>
+              <a:rPr lang="tr-TR" dirty="0"/>
+              <a:t>Java 8 ile Gelen Özellikler</a:t>
+            </a:r>
+            <a:endParaRPr lang="en-GB" dirty="0"/>
+          </a:p>
+        </p:txBody>
+      </p:sp>
+      <p:sp>
+        <p:nvSpPr>
+          <p:cNvPr id="3" name="İçerik Yer Tutucusu 2">
+            <a:extLst>
+              <a:ext uri="{FF2B5EF4-FFF2-40B4-BE49-F238E27FC236}">
+                <a16:creationId xmlns:a16="http://schemas.microsoft.com/office/drawing/2014/main" id="{426553D3-0C7D-4AA1-A8D0-4935ACE4E1F8}"/>
+              </a:ext>
+            </a:extLst>
+          </p:cNvPr>
+          <p:cNvSpPr>
+            <a:spLocks noGrp="1"/>
+          </p:cNvSpPr>
+          <p:nvPr>
+            <p:ph idx="1"/>
+          </p:nvPr>
+        </p:nvSpPr>
+        <p:spPr/>
+        <p:txBody>
+          <a:bodyPr>
+            <a:normAutofit lnSpcReduction="10000"/>
+          </a:bodyPr>
+          <a:lstStyle/>
+          <a:p>
+            <a:r>
+              <a:rPr lang="tr-TR" dirty="0" err="1"/>
+              <a:t>Lambda</a:t>
+            </a:r>
+            <a:r>
+              <a:rPr lang="tr-TR" dirty="0"/>
+              <a:t> İfadeleri: Herhangi bir </a:t>
+            </a:r>
+            <a:r>
+              <a:rPr lang="tr-TR" dirty="0" err="1"/>
+              <a:t>class’a</a:t>
+            </a:r>
+            <a:r>
+              <a:rPr lang="tr-TR" dirty="0"/>
+              <a:t> ait olmadan iş yapabilen fonksiyonlardır. Kodun okunabilirliğini arttıran ve kod tekrarının önüne geçen bir özelliktir.</a:t>
+            </a:r>
+          </a:p>
+          <a:p>
+            <a:r>
+              <a:rPr lang="tr-TR" dirty="0"/>
+              <a:t>Fonksiyonel </a:t>
+            </a:r>
+            <a:r>
+              <a:rPr lang="tr-TR" dirty="0" err="1"/>
+              <a:t>Arayüz</a:t>
+            </a:r>
+            <a:r>
+              <a:rPr lang="tr-TR" dirty="0"/>
+              <a:t>: </a:t>
+            </a:r>
+            <a:r>
+              <a:rPr lang="tr-TR" dirty="0" err="1"/>
+              <a:t>Lambda</a:t>
+            </a:r>
+            <a:r>
+              <a:rPr lang="tr-TR" dirty="0"/>
+              <a:t> ifadelerini uygulayabilmek için tasarlanmış ve yalnızca bir soyut metoda sahiptir. İçinde birden fazla </a:t>
+            </a:r>
+            <a:r>
+              <a:rPr lang="tr-TR" dirty="0" err="1"/>
+              <a:t>static</a:t>
+            </a:r>
+            <a:r>
+              <a:rPr lang="tr-TR" dirty="0"/>
+              <a:t> ve </a:t>
+            </a:r>
+            <a:r>
+              <a:rPr lang="tr-TR" dirty="0" err="1"/>
+              <a:t>default</a:t>
+            </a:r>
+            <a:r>
+              <a:rPr lang="tr-TR" dirty="0"/>
+              <a:t> </a:t>
+            </a:r>
+            <a:r>
+              <a:rPr lang="tr-TR" dirty="0" err="1"/>
+              <a:t>metodlar</a:t>
+            </a:r>
+            <a:r>
+              <a:rPr lang="tr-TR" dirty="0"/>
+              <a:t> barındırabilir.</a:t>
+            </a:r>
+          </a:p>
+          <a:p>
+            <a:r>
+              <a:rPr lang="tr-TR" dirty="0"/>
+              <a:t>Metot Referansı: Öncesinde bir metoda parametre olarak </a:t>
+            </a:r>
+            <a:r>
+              <a:rPr lang="tr-TR" dirty="0" err="1"/>
+              <a:t>primitive</a:t>
+            </a:r>
+            <a:r>
+              <a:rPr lang="tr-TR" dirty="0"/>
+              <a:t> türde bir değişken veya nesne gönderilebiliyordu, Java 8 ile artık bir metoda aynı formatta olan bir metodun referans alınabileceği söylenebiliyor.</a:t>
+            </a:r>
+          </a:p>
+          <a:p>
+            <a:r>
+              <a:rPr lang="tr-TR" dirty="0" err="1"/>
+              <a:t>Stream</a:t>
+            </a:r>
+            <a:r>
+              <a:rPr lang="tr-TR" dirty="0"/>
+              <a:t> API: </a:t>
+            </a:r>
+            <a:r>
+              <a:rPr lang="tr-TR" dirty="0" err="1"/>
+              <a:t>Collectionlar</a:t>
+            </a:r>
+            <a:r>
+              <a:rPr lang="tr-TR" dirty="0"/>
+              <a:t> üzerinde bazı işlemleri yapmayı kolaylaştıran bir yapı.</a:t>
+            </a:r>
+          </a:p>
+          <a:p>
+            <a:r>
+              <a:rPr lang="tr-TR" dirty="0" err="1"/>
+              <a:t>Optional</a:t>
+            </a:r>
+            <a:r>
+              <a:rPr lang="tr-TR" dirty="0"/>
+              <a:t> Class: Bir objenin kullanılmadan önce </a:t>
+            </a:r>
+            <a:r>
+              <a:rPr lang="tr-TR" dirty="0" err="1"/>
+              <a:t>null</a:t>
+            </a:r>
+            <a:r>
+              <a:rPr lang="tr-TR" dirty="0"/>
+              <a:t> </a:t>
+            </a:r>
+            <a:r>
+              <a:rPr lang="tr-TR" dirty="0" err="1"/>
+              <a:t>checklerini</a:t>
+            </a:r>
+            <a:r>
+              <a:rPr lang="tr-TR" dirty="0"/>
+              <a:t> daha okunabilir ve kontrol edilebilir yapar.</a:t>
+            </a:r>
+          </a:p>
+        </p:txBody>
+      </p:sp>
+    </p:spTree>
+    <p:extLst>
+      <p:ext uri="{BB962C8B-B14F-4D97-AF65-F5344CB8AC3E}">
+        <p14:creationId xmlns:p14="http://schemas.microsoft.com/office/powerpoint/2010/main" val="757955947"/>
+      </p:ext>
+    </p:extLst>
+  </p:cSld>
+  <p:clrMapOvr>
+    <a:masterClrMapping/>
+  </p:clrMapOvr>
+</p:sld>
+</file>
+
+<file path=ppt/slides/slide23.xml><?xml version="1.0" encoding="utf-8"?>
+<p:sld xmlns:a="http://schemas.openxmlformats.org/drawingml/2006/main" xmlns:r="http://schemas.openxmlformats.org/officeDocument/2006/relationships" xmlns:p="http://schemas.openxmlformats.org/presentationml/2006/main">
+  <p:cSld>
+    <p:spTree>
+      <p:nvGrpSpPr>
+        <p:cNvPr id="1" name=""/>
+        <p:cNvGrpSpPr/>
+        <p:nvPr/>
+      </p:nvGrpSpPr>
+      <p:grpSpPr>
+        <a:xfrm>
+          <a:off x="0" y="0"/>
+          <a:ext cx="0" cy="0"/>
+          <a:chOff x="0" y="0"/>
+          <a:chExt cx="0" cy="0"/>
+        </a:xfrm>
+      </p:grpSpPr>
+      <p:sp>
+        <p:nvSpPr>
+          <p:cNvPr id="2" name="Başlık 1">
+            <a:extLst>
+              <a:ext uri="{FF2B5EF4-FFF2-40B4-BE49-F238E27FC236}">
+                <a16:creationId xmlns:a16="http://schemas.microsoft.com/office/drawing/2014/main" id="{FDF9674E-64F8-4784-A834-0B5307BBB12F}"/>
+              </a:ext>
+            </a:extLst>
+          </p:cNvPr>
+          <p:cNvSpPr>
+            <a:spLocks noGrp="1"/>
+          </p:cNvSpPr>
+          <p:nvPr>
+            <p:ph type="title"/>
+          </p:nvPr>
+        </p:nvSpPr>
+        <p:spPr/>
+        <p:txBody>
+          <a:bodyPr/>
+          <a:lstStyle/>
+          <a:p>
+            <a:r>
+              <a:rPr lang="tr-TR" dirty="0"/>
+              <a:t>Java 8 ile Gelen Özellikler</a:t>
+            </a:r>
+            <a:endParaRPr lang="en-GB" dirty="0"/>
+          </a:p>
+        </p:txBody>
+      </p:sp>
+      <p:sp>
+        <p:nvSpPr>
+          <p:cNvPr id="3" name="İçerik Yer Tutucusu 2">
+            <a:extLst>
+              <a:ext uri="{FF2B5EF4-FFF2-40B4-BE49-F238E27FC236}">
+                <a16:creationId xmlns:a16="http://schemas.microsoft.com/office/drawing/2014/main" id="{7BF3AF44-9F21-4CCE-A6D3-9A65034F06BE}"/>
+              </a:ext>
+            </a:extLst>
+          </p:cNvPr>
+          <p:cNvSpPr>
+            <a:spLocks noGrp="1"/>
+          </p:cNvSpPr>
+          <p:nvPr>
+            <p:ph idx="1"/>
+          </p:nvPr>
+        </p:nvSpPr>
+        <p:spPr/>
+        <p:txBody>
+          <a:bodyPr>
+            <a:normAutofit/>
+          </a:bodyPr>
+          <a:lstStyle/>
+          <a:p>
+            <a:r>
+              <a:rPr lang="tr-TR" dirty="0" err="1"/>
+              <a:t>Concurrency</a:t>
+            </a:r>
+            <a:r>
+              <a:rPr lang="tr-TR" dirty="0"/>
+              <a:t> </a:t>
+            </a:r>
+            <a:r>
+              <a:rPr lang="tr-TR" dirty="0" err="1"/>
+              <a:t>Improvement</a:t>
+            </a:r>
+            <a:r>
+              <a:rPr lang="tr-TR" dirty="0"/>
+              <a:t>: </a:t>
+            </a:r>
+            <a:r>
+              <a:rPr lang="tr-TR" dirty="0" err="1"/>
+              <a:t>Concurrent</a:t>
+            </a:r>
+            <a:r>
+              <a:rPr lang="tr-TR" dirty="0"/>
+              <a:t> ve </a:t>
+            </a:r>
+            <a:r>
+              <a:rPr lang="tr-TR" dirty="0" err="1"/>
+              <a:t>multitasking</a:t>
+            </a:r>
+            <a:r>
+              <a:rPr lang="tr-TR" dirty="0"/>
+              <a:t> işlemleri daha anlaşılır hale getirmiştir.</a:t>
+            </a:r>
+          </a:p>
+          <a:p>
+            <a:r>
+              <a:rPr lang="tr-TR" dirty="0" err="1"/>
+              <a:t>Default</a:t>
+            </a:r>
+            <a:r>
+              <a:rPr lang="tr-TR" dirty="0"/>
+              <a:t> </a:t>
+            </a:r>
+            <a:r>
+              <a:rPr lang="tr-TR" dirty="0" err="1"/>
+              <a:t>Metodlar</a:t>
+            </a:r>
+            <a:r>
+              <a:rPr lang="tr-TR" dirty="0"/>
+              <a:t>: Herhangi bir </a:t>
+            </a:r>
+            <a:r>
+              <a:rPr lang="tr-TR" dirty="0" err="1"/>
+              <a:t>arayüz</a:t>
+            </a:r>
+            <a:r>
+              <a:rPr lang="tr-TR" dirty="0"/>
+              <a:t> sınıfında gövdesiz </a:t>
+            </a:r>
+            <a:r>
+              <a:rPr lang="tr-TR" dirty="0" err="1"/>
+              <a:t>method</a:t>
+            </a:r>
+            <a:r>
+              <a:rPr lang="tr-TR" dirty="0"/>
+              <a:t> yazmayı mümkün kılar.</a:t>
+            </a:r>
+          </a:p>
+          <a:p>
+            <a:r>
+              <a:rPr lang="tr-TR"/>
+              <a:t>StringJoiner</a:t>
+            </a:r>
+            <a:endParaRPr lang="tr-TR" dirty="0"/>
+          </a:p>
+          <a:p>
+            <a:r>
+              <a:rPr lang="tr-TR" dirty="0"/>
+              <a:t>Collectors </a:t>
+            </a:r>
+            <a:r>
+              <a:rPr lang="tr-TR" dirty="0" err="1"/>
+              <a:t>class</a:t>
+            </a:r>
+            <a:endParaRPr lang="tr-TR" dirty="0"/>
+          </a:p>
+          <a:p>
+            <a:r>
+              <a:rPr lang="tr-TR" dirty="0"/>
+              <a:t>Paralel </a:t>
+            </a:r>
+            <a:r>
+              <a:rPr lang="tr-TR" dirty="0" err="1"/>
+              <a:t>array</a:t>
+            </a:r>
+            <a:r>
+              <a:rPr lang="tr-TR" dirty="0"/>
+              <a:t> </a:t>
+            </a:r>
+            <a:r>
+              <a:rPr lang="tr-TR" dirty="0" err="1"/>
+              <a:t>sorting</a:t>
+            </a:r>
+            <a:endParaRPr lang="en-GB" b="0" i="0" dirty="0">
+              <a:solidFill>
+                <a:srgbClr val="292929"/>
+              </a:solidFill>
+              <a:effectLst/>
+              <a:latin typeface="charter"/>
+            </a:endParaRPr>
+          </a:p>
+          <a:p>
+            <a:pPr algn="l"/>
+            <a:r>
+              <a:rPr lang="tr-TR" b="0" i="0" dirty="0" err="1">
+                <a:solidFill>
+                  <a:srgbClr val="292929"/>
+                </a:solidFill>
+                <a:effectLst/>
+                <a:latin typeface="charter"/>
+              </a:rPr>
+              <a:t>Date</a:t>
+            </a:r>
+            <a:r>
+              <a:rPr lang="tr-TR" b="0" i="0" dirty="0">
+                <a:solidFill>
+                  <a:srgbClr val="292929"/>
+                </a:solidFill>
+                <a:effectLst/>
+                <a:latin typeface="charter"/>
+              </a:rPr>
+              <a:t> </a:t>
+            </a:r>
+            <a:r>
+              <a:rPr lang="tr-TR" b="0" i="0" dirty="0" err="1">
+                <a:solidFill>
+                  <a:srgbClr val="292929"/>
+                </a:solidFill>
+                <a:effectLst/>
+                <a:latin typeface="charter"/>
+              </a:rPr>
+              <a:t>and</a:t>
+            </a:r>
+            <a:r>
+              <a:rPr lang="tr-TR" b="0" i="0" dirty="0">
+                <a:solidFill>
+                  <a:srgbClr val="292929"/>
+                </a:solidFill>
+                <a:effectLst/>
+                <a:latin typeface="charter"/>
+              </a:rPr>
+              <a:t> Time API: </a:t>
+            </a:r>
+            <a:r>
+              <a:rPr lang="en-GB" b="0" i="0" dirty="0" err="1">
+                <a:solidFill>
+                  <a:srgbClr val="292929"/>
+                </a:solidFill>
+                <a:effectLst/>
+                <a:latin typeface="charter"/>
+              </a:rPr>
+              <a:t>Tarih</a:t>
+            </a:r>
+            <a:r>
+              <a:rPr lang="en-GB" b="0" i="0" dirty="0">
+                <a:solidFill>
+                  <a:srgbClr val="292929"/>
+                </a:solidFill>
+                <a:effectLst/>
+                <a:latin typeface="charter"/>
+              </a:rPr>
+              <a:t> </a:t>
+            </a:r>
+            <a:r>
+              <a:rPr lang="en-GB" b="0" i="0" dirty="0" err="1">
+                <a:solidFill>
+                  <a:srgbClr val="292929"/>
+                </a:solidFill>
+                <a:effectLst/>
+                <a:latin typeface="charter"/>
+              </a:rPr>
+              <a:t>ve</a:t>
+            </a:r>
+            <a:r>
+              <a:rPr lang="en-GB" b="0" i="0" dirty="0">
+                <a:solidFill>
+                  <a:srgbClr val="292929"/>
+                </a:solidFill>
+                <a:effectLst/>
+                <a:latin typeface="charter"/>
+              </a:rPr>
+              <a:t> </a:t>
+            </a:r>
+            <a:r>
+              <a:rPr lang="en-GB" b="0" i="0" dirty="0" err="1">
+                <a:solidFill>
+                  <a:srgbClr val="292929"/>
+                </a:solidFill>
+                <a:effectLst/>
+                <a:latin typeface="charter"/>
+              </a:rPr>
+              <a:t>saat</a:t>
+            </a:r>
+            <a:r>
+              <a:rPr lang="en-GB" b="0" i="0" dirty="0">
+                <a:solidFill>
+                  <a:srgbClr val="292929"/>
+                </a:solidFill>
+                <a:effectLst/>
+                <a:latin typeface="charter"/>
+              </a:rPr>
+              <a:t> </a:t>
+            </a:r>
+            <a:r>
+              <a:rPr lang="en-GB" b="0" i="0" dirty="0" err="1">
+                <a:solidFill>
+                  <a:srgbClr val="292929"/>
+                </a:solidFill>
+                <a:effectLst/>
+                <a:latin typeface="charter"/>
+              </a:rPr>
+              <a:t>verilerinin</a:t>
+            </a:r>
+            <a:r>
+              <a:rPr lang="en-GB" b="0" i="0" dirty="0">
+                <a:solidFill>
+                  <a:srgbClr val="292929"/>
+                </a:solidFill>
+                <a:effectLst/>
+                <a:latin typeface="charter"/>
+              </a:rPr>
+              <a:t> </a:t>
+            </a:r>
+            <a:r>
+              <a:rPr lang="en-GB" b="0" i="0" dirty="0" err="1">
+                <a:solidFill>
+                  <a:srgbClr val="292929"/>
+                </a:solidFill>
+                <a:effectLst/>
+                <a:latin typeface="charter"/>
+              </a:rPr>
+              <a:t>daha</a:t>
+            </a:r>
+            <a:r>
+              <a:rPr lang="en-GB" b="0" i="0" dirty="0">
+                <a:solidFill>
+                  <a:srgbClr val="292929"/>
+                </a:solidFill>
+                <a:effectLst/>
+                <a:latin typeface="charter"/>
+              </a:rPr>
+              <a:t> </a:t>
+            </a:r>
+            <a:r>
+              <a:rPr lang="en-GB" b="0" i="0" dirty="0" err="1">
+                <a:solidFill>
+                  <a:srgbClr val="292929"/>
+                </a:solidFill>
+                <a:effectLst/>
+                <a:latin typeface="charter"/>
+              </a:rPr>
+              <a:t>doğal</a:t>
+            </a:r>
+            <a:r>
+              <a:rPr lang="en-GB" b="0" i="0" dirty="0">
+                <a:solidFill>
+                  <a:srgbClr val="292929"/>
+                </a:solidFill>
+                <a:effectLst/>
+                <a:latin typeface="charter"/>
+              </a:rPr>
+              <a:t>, net </a:t>
+            </a:r>
+            <a:r>
+              <a:rPr lang="en-GB" b="0" i="0" dirty="0" err="1">
+                <a:solidFill>
+                  <a:srgbClr val="292929"/>
+                </a:solidFill>
+                <a:effectLst/>
+                <a:latin typeface="charter"/>
+              </a:rPr>
+              <a:t>ve</a:t>
+            </a:r>
+            <a:r>
+              <a:rPr lang="en-GB" b="0" i="0" dirty="0">
+                <a:solidFill>
+                  <a:srgbClr val="292929"/>
+                </a:solidFill>
+                <a:effectLst/>
+                <a:latin typeface="charter"/>
+              </a:rPr>
+              <a:t> </a:t>
+            </a:r>
+            <a:r>
+              <a:rPr lang="en-GB" b="0" i="0" dirty="0" err="1">
+                <a:solidFill>
+                  <a:srgbClr val="292929"/>
+                </a:solidFill>
+                <a:effectLst/>
+                <a:latin typeface="charter"/>
+              </a:rPr>
+              <a:t>anlaşılması</a:t>
+            </a:r>
+            <a:r>
+              <a:rPr lang="en-GB" b="0" i="0" dirty="0">
+                <a:solidFill>
+                  <a:srgbClr val="292929"/>
+                </a:solidFill>
+                <a:effectLst/>
+                <a:latin typeface="charter"/>
+              </a:rPr>
+              <a:t> </a:t>
+            </a:r>
+            <a:r>
+              <a:rPr lang="en-GB" b="0" i="0" dirty="0" err="1">
+                <a:solidFill>
+                  <a:srgbClr val="292929"/>
+                </a:solidFill>
+                <a:effectLst/>
+                <a:latin typeface="charter"/>
+              </a:rPr>
+              <a:t>kolay</a:t>
+            </a:r>
+            <a:r>
+              <a:rPr lang="en-GB" b="0" i="0" dirty="0">
+                <a:solidFill>
+                  <a:srgbClr val="292929"/>
+                </a:solidFill>
+                <a:effectLst/>
+                <a:latin typeface="charter"/>
+              </a:rPr>
+              <a:t> </a:t>
+            </a:r>
+            <a:r>
+              <a:rPr lang="en-GB" b="0" i="0" dirty="0" err="1">
+                <a:solidFill>
+                  <a:srgbClr val="292929"/>
+                </a:solidFill>
+                <a:effectLst/>
+                <a:latin typeface="charter"/>
+              </a:rPr>
+              <a:t>şekilde</a:t>
+            </a:r>
+            <a:r>
+              <a:rPr lang="en-GB" b="0" i="0" dirty="0">
+                <a:solidFill>
+                  <a:srgbClr val="292929"/>
+                </a:solidFill>
+                <a:effectLst/>
+                <a:latin typeface="charter"/>
+              </a:rPr>
+              <a:t> </a:t>
+            </a:r>
+            <a:r>
+              <a:rPr lang="en-GB" b="0" i="0" dirty="0" err="1">
+                <a:solidFill>
+                  <a:srgbClr val="292929"/>
+                </a:solidFill>
+                <a:effectLst/>
+                <a:latin typeface="charter"/>
+              </a:rPr>
+              <a:t>elde</a:t>
+            </a:r>
+            <a:r>
+              <a:rPr lang="en-GB" b="0" i="0" dirty="0">
+                <a:solidFill>
+                  <a:srgbClr val="292929"/>
+                </a:solidFill>
+                <a:effectLst/>
+                <a:latin typeface="charter"/>
+              </a:rPr>
+              <a:t> </a:t>
+            </a:r>
+            <a:r>
+              <a:rPr lang="en-GB" b="0" i="0" dirty="0" err="1">
+                <a:solidFill>
+                  <a:srgbClr val="292929"/>
+                </a:solidFill>
+                <a:effectLst/>
+                <a:latin typeface="charter"/>
+              </a:rPr>
+              <a:t>edilmesini</a:t>
+            </a:r>
+            <a:r>
+              <a:rPr lang="en-GB" b="0" i="0" dirty="0">
+                <a:solidFill>
+                  <a:srgbClr val="292929"/>
+                </a:solidFill>
+                <a:effectLst/>
+                <a:latin typeface="charter"/>
+              </a:rPr>
+              <a:t> </a:t>
+            </a:r>
+            <a:r>
+              <a:rPr lang="en-GB" b="0" i="0" dirty="0" err="1">
+                <a:solidFill>
+                  <a:srgbClr val="292929"/>
+                </a:solidFill>
+                <a:effectLst/>
+                <a:latin typeface="charter"/>
+              </a:rPr>
+              <a:t>sağl</a:t>
+            </a:r>
+            <a:r>
+              <a:rPr lang="tr-TR" b="0" i="0" dirty="0">
+                <a:solidFill>
+                  <a:srgbClr val="292929"/>
+                </a:solidFill>
+                <a:effectLst/>
+                <a:latin typeface="charter"/>
+              </a:rPr>
+              <a:t>ar.</a:t>
+            </a:r>
+            <a:endParaRPr lang="en-GB" b="0" i="0" dirty="0">
+              <a:solidFill>
+                <a:srgbClr val="292929"/>
+              </a:solidFill>
+              <a:effectLst/>
+              <a:latin typeface="charter"/>
+            </a:endParaRPr>
+          </a:p>
+          <a:p>
+            <a:endParaRPr lang="en-GB" dirty="0"/>
+          </a:p>
+        </p:txBody>
+      </p:sp>
+    </p:spTree>
+    <p:extLst>
+      <p:ext uri="{BB962C8B-B14F-4D97-AF65-F5344CB8AC3E}">
+        <p14:creationId xmlns:p14="http://schemas.microsoft.com/office/powerpoint/2010/main" val="3017733842"/>
+      </p:ext>
+    </p:extLst>
+  </p:cSld>
+  <p:clrMapOvr>
+    <a:masterClrMapping/>
+  </p:clrMapOvr>
+</p:sld>
+</file>
+
+<file path=ppt/slides/slide24.xml><?xml version="1.0" encoding="utf-8"?>
+<p:sld xmlns:a="http://schemas.openxmlformats.org/drawingml/2006/main" xmlns:r="http://schemas.openxmlformats.org/officeDocument/2006/relationships" xmlns:p="http://schemas.openxmlformats.org/presentationml/2006/main">
+  <p:cSld>
+    <p:spTree>
+      <p:nvGrpSpPr>
+        <p:cNvPr id="1" name=""/>
+        <p:cNvGrpSpPr/>
+        <p:nvPr/>
+      </p:nvGrpSpPr>
+      <p:grpSpPr>
+        <a:xfrm>
+          <a:off x="0" y="0"/>
+          <a:ext cx="0" cy="0"/>
+          <a:chOff x="0" y="0"/>
+          <a:chExt cx="0" cy="0"/>
+        </a:xfrm>
+      </p:grpSpPr>
+      <p:sp>
+        <p:nvSpPr>
+          <p:cNvPr id="2" name="Başlık 1">
+            <a:extLst>
+              <a:ext uri="{FF2B5EF4-FFF2-40B4-BE49-F238E27FC236}">
+                <a16:creationId xmlns:a16="http://schemas.microsoft.com/office/drawing/2014/main" id="{B09BAEB4-9AE9-48EA-B3CA-031ED53C33AD}"/>
+              </a:ext>
+            </a:extLst>
+          </p:cNvPr>
+          <p:cNvSpPr>
+            <a:spLocks noGrp="1"/>
+          </p:cNvSpPr>
+          <p:nvPr>
+            <p:ph type="title"/>
+          </p:nvPr>
+        </p:nvSpPr>
+        <p:spPr/>
+        <p:txBody>
+          <a:bodyPr/>
+          <a:lstStyle/>
+          <a:p>
+            <a:r>
+              <a:rPr lang="tr-TR" dirty="0"/>
+              <a:t>Kaynakça</a:t>
+            </a:r>
+            <a:endParaRPr lang="en-GB" dirty="0"/>
+          </a:p>
+        </p:txBody>
+      </p:sp>
+      <p:sp>
+        <p:nvSpPr>
+          <p:cNvPr id="3" name="İçerik Yer Tutucusu 2">
+            <a:extLst>
+              <a:ext uri="{FF2B5EF4-FFF2-40B4-BE49-F238E27FC236}">
+                <a16:creationId xmlns:a16="http://schemas.microsoft.com/office/drawing/2014/main" id="{6E4C17DF-957D-48B7-9E89-04195F4D843B}"/>
+              </a:ext>
+            </a:extLst>
+          </p:cNvPr>
+          <p:cNvSpPr>
+            <a:spLocks noGrp="1"/>
+          </p:cNvSpPr>
+          <p:nvPr>
+            <p:ph idx="1"/>
+          </p:nvPr>
+        </p:nvSpPr>
+        <p:spPr/>
+        <p:txBody>
+          <a:bodyPr/>
+          <a:lstStyle/>
+          <a:p>
+            <a:r>
+              <a:rPr lang="en-GB" dirty="0">
+                <a:hlinkClick r:id="rId2"/>
+              </a:rPr>
+              <a:t>https://devnot.com/2017/java-8-hakkinda-bilmeniz-gerekenler/</a:t>
+            </a:r>
+            <a:endParaRPr lang="tr-TR" dirty="0"/>
+          </a:p>
+          <a:p>
+            <a:r>
+              <a:rPr lang="en-GB" dirty="0">
+                <a:hlinkClick r:id="rId3"/>
+              </a:rPr>
+              <a:t>https://farukgenc.com/java/java-8-yenilikleri-bolum-1.html</a:t>
+            </a:r>
+            <a:endParaRPr lang="tr-TR" dirty="0"/>
+          </a:p>
+          <a:p>
+            <a:r>
+              <a:rPr lang="tr-TR" dirty="0">
+                <a:hlinkClick r:id="rId4"/>
+              </a:rPr>
+              <a:t>https://www.javatpoint.com/java-8-features</a:t>
+            </a:r>
+            <a:endParaRPr lang="tr-TR" dirty="0"/>
+          </a:p>
+          <a:p>
+            <a:r>
+              <a:rPr lang="tr-TR" dirty="0">
+                <a:hlinkClick r:id="rId5"/>
+              </a:rPr>
+              <a:t>https://medium.com/huawei-developers-tr/java-versiyonlar%C4%B1-ve-gelen-yenilikler-8-16-1d024561b5b9</a:t>
+            </a:r>
+            <a:endParaRPr lang="tr-TR" dirty="0"/>
+          </a:p>
+          <a:p>
+            <a:endParaRPr lang="tr-TR" dirty="0"/>
+          </a:p>
+        </p:txBody>
+      </p:sp>
+    </p:spTree>
+    <p:extLst>
+      <p:ext uri="{BB962C8B-B14F-4D97-AF65-F5344CB8AC3E}">
+        <p14:creationId xmlns:p14="http://schemas.microsoft.com/office/powerpoint/2010/main" val="3066770274"/>
       </p:ext>
     </p:extLst>
   </p:cSld>
@@ -13018,7 +13942,7 @@
           <p:cNvPr id="2" name="Başlık 1">
             <a:extLst>
               <a:ext uri="{FF2B5EF4-FFF2-40B4-BE49-F238E27FC236}">
-                <a16:creationId xmlns:a16="http://schemas.microsoft.com/office/drawing/2014/main" xmlns="" id="{7D806EFB-AB07-4BE8-87BD-E31332F4218E}"/>
+                <a16:creationId xmlns:a16="http://schemas.microsoft.com/office/drawing/2014/main" id="{7D806EFB-AB07-4BE8-87BD-E31332F4218E}"/>
               </a:ext>
             </a:extLst>
           </p:cNvPr>
@@ -13047,7 +13971,7 @@
           <p:cNvPr id="3" name="İçerik Yer Tutucusu 2">
             <a:extLst>
               <a:ext uri="{FF2B5EF4-FFF2-40B4-BE49-F238E27FC236}">
-                <a16:creationId xmlns:a16="http://schemas.microsoft.com/office/drawing/2014/main" xmlns="" id="{5F85C8E6-9634-4A6A-86D6-D6D4727B423E}"/>
+                <a16:creationId xmlns:a16="http://schemas.microsoft.com/office/drawing/2014/main" id="{5F85C8E6-9634-4A6A-86D6-D6D4727B423E}"/>
               </a:ext>
             </a:extLst>
           </p:cNvPr>
@@ -13842,7 +14766,7 @@
           <p:cNvPr id="2" name="Başlık 1">
             <a:extLst>
               <a:ext uri="{FF2B5EF4-FFF2-40B4-BE49-F238E27FC236}">
-                <a16:creationId xmlns:a16="http://schemas.microsoft.com/office/drawing/2014/main" xmlns="" id="{E167B04B-B2B3-44F5-8189-551FEF8F87D5}"/>
+                <a16:creationId xmlns:a16="http://schemas.microsoft.com/office/drawing/2014/main" id="{E167B04B-B2B3-44F5-8189-551FEF8F87D5}"/>
               </a:ext>
             </a:extLst>
           </p:cNvPr>
@@ -13873,7 +14797,7 @@
           <p:cNvPr id="3" name="İçerik Yer Tutucusu 2">
             <a:extLst>
               <a:ext uri="{FF2B5EF4-FFF2-40B4-BE49-F238E27FC236}">
-                <a16:creationId xmlns:a16="http://schemas.microsoft.com/office/drawing/2014/main" xmlns="" id="{D9F70F29-7827-4009-9436-23A419287A5F}"/>
+                <a16:creationId xmlns:a16="http://schemas.microsoft.com/office/drawing/2014/main" id="{D9F70F29-7827-4009-9436-23A419287A5F}"/>
               </a:ext>
             </a:extLst>
           </p:cNvPr>
@@ -14622,7 +15546,7 @@
           <p:cNvPr id="2" name="Başlık 1">
             <a:extLst>
               <a:ext uri="{FF2B5EF4-FFF2-40B4-BE49-F238E27FC236}">
-                <a16:creationId xmlns:a16="http://schemas.microsoft.com/office/drawing/2014/main" xmlns="" id="{64D54798-B71E-45CD-B3E3-95D131A11445}"/>
+                <a16:creationId xmlns:a16="http://schemas.microsoft.com/office/drawing/2014/main" id="{64D54798-B71E-45CD-B3E3-95D131A11445}"/>
               </a:ext>
             </a:extLst>
           </p:cNvPr>
@@ -14651,7 +15575,7 @@
           <p:cNvPr id="3" name="İçerik Yer Tutucusu 2">
             <a:extLst>
               <a:ext uri="{FF2B5EF4-FFF2-40B4-BE49-F238E27FC236}">
-                <a16:creationId xmlns:a16="http://schemas.microsoft.com/office/drawing/2014/main" xmlns="" id="{B9FABF43-6E3B-4235-803F-201BE74D1DAD}"/>
+                <a16:creationId xmlns:a16="http://schemas.microsoft.com/office/drawing/2014/main" id="{B9FABF43-6E3B-4235-803F-201BE74D1DAD}"/>
               </a:ext>
             </a:extLst>
           </p:cNvPr>
@@ -15184,7 +16108,7 @@
           <p:cNvPr id="2" name="Başlık 1">
             <a:extLst>
               <a:ext uri="{FF2B5EF4-FFF2-40B4-BE49-F238E27FC236}">
-                <a16:creationId xmlns:a16="http://schemas.microsoft.com/office/drawing/2014/main" xmlns="" id="{E3468309-7CF1-448E-A1F3-726C39CB0B1C}"/>
+                <a16:creationId xmlns:a16="http://schemas.microsoft.com/office/drawing/2014/main" id="{E3468309-7CF1-448E-A1F3-726C39CB0B1C}"/>
               </a:ext>
             </a:extLst>
           </p:cNvPr>
@@ -15213,7 +16137,7 @@
           <p:cNvPr id="3" name="İçerik Yer Tutucusu 2">
             <a:extLst>
               <a:ext uri="{FF2B5EF4-FFF2-40B4-BE49-F238E27FC236}">
-                <a16:creationId xmlns:a16="http://schemas.microsoft.com/office/drawing/2014/main" xmlns="" id="{55665A22-C7B4-4E85-926B-D5B05E4F93BD}"/>
+                <a16:creationId xmlns:a16="http://schemas.microsoft.com/office/drawing/2014/main" id="{55665A22-C7B4-4E85-926B-D5B05E4F93BD}"/>
               </a:ext>
             </a:extLst>
           </p:cNvPr>
@@ -16047,7 +16971,7 @@
           <p:cNvPr id="2" name="Başlık 1">
             <a:extLst>
               <a:ext uri="{FF2B5EF4-FFF2-40B4-BE49-F238E27FC236}">
-                <a16:creationId xmlns:a16="http://schemas.microsoft.com/office/drawing/2014/main" xmlns="" id="{C641F9B2-5523-435F-A2A7-915E1425C2FA}"/>
+                <a16:creationId xmlns:a16="http://schemas.microsoft.com/office/drawing/2014/main" id="{C641F9B2-5523-435F-A2A7-915E1425C2FA}"/>
               </a:ext>
             </a:extLst>
           </p:cNvPr>
@@ -16076,7 +17000,7 @@
           <p:cNvPr id="3" name="İçerik Yer Tutucusu 2">
             <a:extLst>
               <a:ext uri="{FF2B5EF4-FFF2-40B4-BE49-F238E27FC236}">
-                <a16:creationId xmlns:a16="http://schemas.microsoft.com/office/drawing/2014/main" xmlns="" id="{A2B10130-2ECF-4C84-A6E5-7CAA2E0EDB9E}"/>
+                <a16:creationId xmlns:a16="http://schemas.microsoft.com/office/drawing/2014/main" id="{A2B10130-2ECF-4C84-A6E5-7CAA2E0EDB9E}"/>
               </a:ext>
             </a:extLst>
           </p:cNvPr>
@@ -16353,7 +17277,7 @@
           <p:cNvPr id="2" name="Başlık 1">
             <a:extLst>
               <a:ext uri="{FF2B5EF4-FFF2-40B4-BE49-F238E27FC236}">
-                <a16:creationId xmlns:a16="http://schemas.microsoft.com/office/drawing/2014/main" xmlns="" id="{6603EFE5-34AE-4CBE-A1F9-1E01323E7437}"/>
+                <a16:creationId xmlns:a16="http://schemas.microsoft.com/office/drawing/2014/main" id="{6603EFE5-34AE-4CBE-A1F9-1E01323E7437}"/>
               </a:ext>
             </a:extLst>
           </p:cNvPr>
@@ -16382,7 +17306,7 @@
           <p:cNvPr id="3" name="İçerik Yer Tutucusu 2">
             <a:extLst>
               <a:ext uri="{FF2B5EF4-FFF2-40B4-BE49-F238E27FC236}">
-                <a16:creationId xmlns:a16="http://schemas.microsoft.com/office/drawing/2014/main" xmlns="" id="{5EDEF04B-2908-47F7-81AE-21C8D9F874B6}"/>
+                <a16:creationId xmlns:a16="http://schemas.microsoft.com/office/drawing/2014/main" id="{5EDEF04B-2908-47F7-81AE-21C8D9F874B6}"/>
               </a:ext>
             </a:extLst>
           </p:cNvPr>
@@ -16643,7 +17567,7 @@
           <p:cNvPr id="2" name="Başlık 1">
             <a:extLst>
               <a:ext uri="{FF2B5EF4-FFF2-40B4-BE49-F238E27FC236}">
-                <a16:creationId xmlns:a16="http://schemas.microsoft.com/office/drawing/2014/main" xmlns="" id="{F54C56FE-9A8D-4032-A19C-A98C5C957241}"/>
+                <a16:creationId xmlns:a16="http://schemas.microsoft.com/office/drawing/2014/main" id="{F54C56FE-9A8D-4032-A19C-A98C5C957241}"/>
               </a:ext>
             </a:extLst>
           </p:cNvPr>
@@ -16672,7 +17596,7 @@
           <p:cNvPr id="5" name="İçerik Yer Tutucusu 4">
             <a:extLst>
               <a:ext uri="{FF2B5EF4-FFF2-40B4-BE49-F238E27FC236}">
-                <a16:creationId xmlns:a16="http://schemas.microsoft.com/office/drawing/2014/main" xmlns="" id="{89017E3B-04D2-427F-A5E1-CF0404B34ECA}"/>
+                <a16:creationId xmlns:a16="http://schemas.microsoft.com/office/drawing/2014/main" id="{89017E3B-04D2-427F-A5E1-CF0404B34ECA}"/>
               </a:ext>
             </a:extLst>
           </p:cNvPr>

</xml_diff>